<commit_message>
updated slides and css
</commit_message>
<xml_diff>
--- a/docs/Final Demo and Presentation.pptx
+++ b/docs/Final Demo and Presentation.pptx
@@ -113,6 +113,14 @@
       </a:defRPr>
     </a:lvl9pPr>
   </p:defaultTextStyle>
+  <p:extLst>
+    <p:ext uri="{EFAFB233-063F-42B5-8137-9DF3F51BA10A}">
+      <p15:sldGuideLst xmlns:p15="http://schemas.microsoft.com/office/powerpoint/2012/main"/>
+    </p:ext>
+    <p:ext uri="{2D200454-40CA-4A62-9FC3-DE9A4176ACB9}">
+      <p15:notesGuideLst xmlns:p15="http://schemas.microsoft.com/office/powerpoint/2012/main"/>
+    </p:ext>
+  </p:extLst>
 </p:presentation>
 </file>
 
@@ -12436,6 +12444,43 @@
           </a:prstGeom>
         </p:spPr>
       </p:pic>
+      <p:sp>
+        <p:nvSpPr>
+          <p:cNvPr id="5" name="Rectangle 4">
+            <a:extLst>
+              <a:ext uri="{FF2B5EF4-FFF2-40B4-BE49-F238E27FC236}">
+                <a16:creationId xmlns:a16="http://schemas.microsoft.com/office/drawing/2014/main" id="{DF8B18A2-8168-45D9-98F4-8D517E75BB5E}"/>
+              </a:ext>
+            </a:extLst>
+          </p:cNvPr>
+          <p:cNvSpPr/>
+          <p:nvPr/>
+        </p:nvSpPr>
+        <p:spPr>
+          <a:xfrm>
+            <a:off x="4657144" y="5908954"/>
+            <a:ext cx="2877711" cy="369332"/>
+          </a:xfrm>
+          <a:prstGeom prst="rect">
+            <a:avLst/>
+          </a:prstGeom>
+        </p:spPr>
+        <p:txBody>
+          <a:bodyPr wrap="none">
+            <a:spAutoFit/>
+          </a:bodyPr>
+          <a:lstStyle/>
+          <a:p>
+            <a:r>
+              <a:rPr lang="en-US" dirty="0">
+                <a:hlinkClick r:id="rId4"/>
+              </a:rPr>
+              <a:t>http://18.221.223.30:3000/</a:t>
+            </a:r>
+            <a:endParaRPr lang="en-US" dirty="0"/>
+          </a:p>
+        </p:txBody>
+      </p:sp>
     </p:spTree>
     <p:extLst>
       <p:ext uri="{BB962C8B-B14F-4D97-AF65-F5344CB8AC3E}">
@@ -12625,6 +12670,63 @@
               <a:rPr lang="en-US" dirty="0"/>
               <a:t>Project Demo</a:t>
             </a:r>
+            <a:br>
+              <a:rPr lang="en-US" dirty="0"/>
+            </a:br>
+            <a:br>
+              <a:rPr lang="en-US" dirty="0"/>
+            </a:br>
+            <a:endParaRPr lang="en-US" dirty="0"/>
+          </a:p>
+        </p:txBody>
+      </p:sp>
+      <p:sp>
+        <p:nvSpPr>
+          <p:cNvPr id="3" name="Rectangle 2">
+            <a:extLst>
+              <a:ext uri="{FF2B5EF4-FFF2-40B4-BE49-F238E27FC236}">
+                <a16:creationId xmlns:a16="http://schemas.microsoft.com/office/drawing/2014/main" id="{4AC14E0D-EB7D-4616-AFC7-E527738674D5}"/>
+              </a:ext>
+            </a:extLst>
+          </p:cNvPr>
+          <p:cNvSpPr/>
+          <p:nvPr/>
+        </p:nvSpPr>
+        <p:spPr>
+          <a:xfrm>
+            <a:off x="3903733" y="4042832"/>
+            <a:ext cx="4384534" cy="523220"/>
+          </a:xfrm>
+          <a:prstGeom prst="rect">
+            <a:avLst/>
+          </a:prstGeom>
+        </p:spPr>
+        <p:txBody>
+          <a:bodyPr wrap="none">
+            <a:spAutoFit/>
+          </a:bodyPr>
+          <a:lstStyle/>
+          <a:p>
+            <a:r>
+              <a:rPr lang="en-US" sz="2800" dirty="0">
+                <a:solidFill>
+                  <a:schemeClr val="bg1"/>
+                </a:solidFill>
+                <a:hlinkClick r:id="rId2">
+                  <a:extLst>
+                    <a:ext uri="{A12FA001-AC4F-418D-AE19-62706E023703}">
+                      <ahyp:hlinkClr xmlns:ahyp="http://schemas.microsoft.com/office/drawing/2018/hyperlinkcolor" val="tx"/>
+                    </a:ext>
+                  </a:extLst>
+                </a:hlinkClick>
+              </a:rPr>
+              <a:t>http://18.221.223.30:3000/</a:t>
+            </a:r>
+            <a:endParaRPr lang="en-US" sz="2800" dirty="0">
+              <a:solidFill>
+                <a:schemeClr val="bg1"/>
+              </a:solidFill>
+            </a:endParaRPr>
           </a:p>
         </p:txBody>
       </p:sp>

</xml_diff>